<commit_message>
Updates for new implementation
</commit_message>
<xml_diff>
--- a/Lecture materials (Antonius)/R0027-Luento-1-Intro.pptx
+++ b/Lecture materials (Antonius)/R0027-Luento-1-Intro.pptx
@@ -2117,7 +2117,7 @@
             </a:pPr>
             <a:fld id="{9243BF99-14F5-42DE-BA49-2D78B4AB83FD}" type="datetime1">
               <a:rPr lang="fi-FI" smtClean="0"/>
-              <a:t>18.1.2017</a:t>
+              <a:t>1.9.2017</a:t>
             </a:fld>
             <a:endParaRPr lang="en-US"/>
           </a:p>
@@ -2317,7 +2317,7 @@
             </a:pPr>
             <a:fld id="{BA7AF33B-D368-4943-9C88-C07E2A466AD4}" type="datetime1">
               <a:rPr lang="fi-FI" smtClean="0"/>
-              <a:t>18.1.2017</a:t>
+              <a:t>1.9.2017</a:t>
             </a:fld>
             <a:endParaRPr lang="en-US"/>
           </a:p>
@@ -2526,7 +2526,7 @@
             </a:pPr>
             <a:fld id="{1BE11728-E41A-41B3-ADC5-28DF3929F2A2}" type="datetime1">
               <a:rPr lang="fi-FI" smtClean="0"/>
-              <a:t>18.1.2017</a:t>
+              <a:t>1.9.2017</a:t>
             </a:fld>
             <a:endParaRPr lang="en-US"/>
           </a:p>
@@ -2792,7 +2792,7 @@
             </a:pPr>
             <a:fld id="{45FB7A60-24F7-4607-818C-8101B1F6544A}" type="datetime1">
               <a:rPr lang="fi-FI" smtClean="0"/>
-              <a:t>18.1.2017</a:t>
+              <a:t>1.9.2017</a:t>
             </a:fld>
             <a:endParaRPr lang="en-US"/>
           </a:p>
@@ -2991,7 +2991,7 @@
             </a:pPr>
             <a:fld id="{A0917F03-5761-4994-BC05-FEA56BB55142}" type="datetime1">
               <a:rPr lang="fi-FI" smtClean="0"/>
-              <a:t>18.1.2017</a:t>
+              <a:t>1.9.2017</a:t>
             </a:fld>
             <a:endParaRPr lang="en-US"/>
           </a:p>
@@ -3216,7 +3216,7 @@
             </a:pPr>
             <a:fld id="{C3BB86B7-8B70-4AA0-AC4B-C8FC14664528}" type="datetime1">
               <a:rPr lang="fi-FI" smtClean="0"/>
-              <a:t>18.1.2017</a:t>
+              <a:t>1.9.2017</a:t>
             </a:fld>
             <a:endParaRPr lang="en-US"/>
           </a:p>
@@ -3537,7 +3537,7 @@
             </a:pPr>
             <a:fld id="{EE0145AC-00E1-4C94-8D6B-EE0ED85AAD1D}" type="datetime1">
               <a:rPr lang="fi-FI" smtClean="0"/>
-              <a:t>18.1.2017</a:t>
+              <a:t>1.9.2017</a:t>
             </a:fld>
             <a:endParaRPr lang="en-US"/>
           </a:p>
@@ -3997,7 +3997,7 @@
             </a:pPr>
             <a:fld id="{AB79CDDC-2D01-4F6C-AC4E-45C12704A4EF}" type="datetime1">
               <a:rPr lang="fi-FI" smtClean="0"/>
-              <a:t>18.1.2017</a:t>
+              <a:t>1.9.2017</a:t>
             </a:fld>
             <a:endParaRPr lang="en-US"/>
           </a:p>
@@ -4144,7 +4144,7 @@
             </a:pPr>
             <a:fld id="{44D4A43D-066C-4DA6-A3D1-A856365AB286}" type="datetime1">
               <a:rPr lang="fi-FI" smtClean="0"/>
-              <a:t>18.1.2017</a:t>
+              <a:t>1.9.2017</a:t>
             </a:fld>
             <a:endParaRPr lang="en-US"/>
           </a:p>
@@ -4268,7 +4268,7 @@
             </a:pPr>
             <a:fld id="{27543B41-9C0A-4AD9-B30E-E7A298F534E9}" type="datetime1">
               <a:rPr lang="fi-FI" smtClean="0"/>
-              <a:t>18.1.2017</a:t>
+              <a:t>1.9.2017</a:t>
             </a:fld>
             <a:endParaRPr lang="en-US"/>
           </a:p>
@@ -4574,7 +4574,7 @@
             </a:pPr>
             <a:fld id="{08DD5A7E-E79C-4271-9C38-02656C0B8982}" type="datetime1">
               <a:rPr lang="fi-FI" smtClean="0"/>
-              <a:t>18.1.2017</a:t>
+              <a:t>1.9.2017</a:t>
             </a:fld>
             <a:endParaRPr lang="en-US"/>
           </a:p>
@@ -4857,7 +4857,7 @@
             </a:pPr>
             <a:fld id="{F4BAE4AA-8E38-4576-8A0C-10C1F477ABCA}" type="datetime1">
               <a:rPr lang="fi-FI" smtClean="0"/>
-              <a:t>18.1.2017</a:t>
+              <a:t>1.9.2017</a:t>
             </a:fld>
             <a:endParaRPr lang="en-US"/>
           </a:p>
@@ -5119,7 +5119,7 @@
             </a:pPr>
             <a:fld id="{D1907589-2AC4-4C60-B385-280C9D0298FA}" type="datetime1">
               <a:rPr lang="fi-FI" smtClean="0"/>
-              <a:t>18.1.2017</a:t>
+              <a:t>1.9.2017</a:t>
             </a:fld>
             <a:endParaRPr lang="en-US"/>
           </a:p>
@@ -6011,7 +6011,7 @@
           <a:p>
             <a:fld id="{F188AE5C-8E4C-4AA5-AC57-3EE1C6E26226}" type="datetime1">
               <a:rPr lang="fi-FI" smtClean="0"/>
-              <a:t>18.1.2017</a:t>
+              <a:t>1.9.2017</a:t>
             </a:fld>
             <a:endParaRPr lang="en-US" smtClean="0"/>
           </a:p>
@@ -6132,18 +6132,22 @@
             <a:pPr eaLnBrk="1" hangingPunct="1"/>
             <a:r>
               <a:rPr lang="fi-FI" sz="2400" dirty="0" smtClean="0"/>
-              <a:t>Yksinkin </a:t>
-            </a:r>
+              <a:t>Yksinkin tekeminen on mahdollista</a:t>
+            </a:r>
+          </a:p>
+          <a:p>
+            <a:pPr eaLnBrk="1" hangingPunct="1"/>
             <a:r>
               <a:rPr lang="fi-FI" sz="2400" dirty="0" smtClean="0"/>
-              <a:t>tekeminen on mahdollista</a:t>
-            </a:r>
-          </a:p>
-          <a:p>
-            <a:pPr eaLnBrk="1" hangingPunct="1"/>
+              <a:t>Kotitehtäviin saa kysyä apua, mutta niitä ei </a:t>
+            </a:r>
             <a:r>
               <a:rPr lang="fi-FI" sz="2400" dirty="0" smtClean="0"/>
-              <a:t>Kotitehtäviin saa kysyä apua, mutta niitä ei saa plagioida suoraan</a:t>
+              <a:t>kannatta plagioida </a:t>
+            </a:r>
+            <a:r>
+              <a:rPr lang="fi-FI" sz="2400" dirty="0" smtClean="0"/>
+              <a:t>suoraan</a:t>
             </a:r>
           </a:p>
           <a:p>
@@ -6405,7 +6409,7 @@
           <a:p>
             <a:fld id="{77738779-5726-4341-BD31-3F113364D60D}" type="datetime1">
               <a:rPr lang="fi-FI" smtClean="0"/>
-              <a:t>18.1.2017</a:t>
+              <a:t>1.9.2017</a:t>
             </a:fld>
             <a:endParaRPr lang="en-US" smtClean="0"/>
           </a:p>
@@ -6539,7 +6543,6 @@
               <a:rPr lang="fi-FI" sz="1600" b="1" dirty="0" smtClean="0"/>
               <a:t>)</a:t>
             </a:r>
-            <a:endParaRPr lang="fi-FI" sz="1600" b="1" dirty="0" smtClean="0"/>
           </a:p>
           <a:p>
             <a:pPr lvl="1" eaLnBrk="1" hangingPunct="1">
@@ -6892,18 +6895,18 @@
               <a:rPr lang="fi-FI" sz="1800" b="1" dirty="0" smtClean="0"/>
             </a:br>
             <a:r>
+              <a:rPr lang="fi-FI" sz="1800" dirty="0">
+                <a:hlinkClick r:id="rId3"/>
+              </a:rPr>
+              <a:t>https://docs.oracle.com/javase/7/docs/api</a:t>
+            </a:r>
+            <a:r>
               <a:rPr lang="fi-FI" sz="1800" dirty="0" smtClean="0">
                 <a:hlinkClick r:id="rId3"/>
               </a:rPr>
-              <a:t>http://download.oracle.com/javase/6/docs/api/</a:t>
-            </a:r>
-            <a:endParaRPr lang="fi-FI" sz="1800" dirty="0" smtClean="0">
-              <a:solidFill>
-                <a:schemeClr val="accent1">
-                  <a:lumMod val="75000"/>
-                </a:schemeClr>
-              </a:solidFill>
-            </a:endParaRPr>
+              <a:t>/</a:t>
+            </a:r>
+            <a:endParaRPr lang="fi-FI" sz="1800" dirty="0" smtClean="0"/>
           </a:p>
           <a:p>
             <a:pPr lvl="1" eaLnBrk="1" hangingPunct="1">
@@ -6915,7 +6918,11 @@
             </a:r>
             <a:r>
               <a:rPr lang="fi-FI" sz="1800" b="1" dirty="0" smtClean="0"/>
-              <a:t> Help</a:t>
+              <a:t> </a:t>
+            </a:r>
+            <a:r>
+              <a:rPr lang="fi-FI" sz="1800" b="1" dirty="0" smtClean="0"/>
+              <a:t>Help</a:t>
             </a:r>
             <a:br>
               <a:rPr lang="fi-FI" sz="1800" b="1" dirty="0" smtClean="0"/>
@@ -7631,7 +7638,6 @@
               <a:rPr lang="fi-FI" sz="2300" dirty="0" smtClean="0"/>
               <a:t>Mobiilisovellukset</a:t>
             </a:r>
-            <a:endParaRPr lang="fi-FI" sz="2300" dirty="0" smtClean="0"/>
           </a:p>
         </p:txBody>
       </p:sp>
@@ -8642,11 +8648,7 @@
             </a:pPr>
             <a:r>
               <a:rPr lang="fi-FI" dirty="0" smtClean="0"/>
-              <a:t>Ohjelmointikielillä voidaan siis määrätä kone tekemään </a:t>
-            </a:r>
-            <a:r>
-              <a:rPr lang="fi-FI" dirty="0" smtClean="0"/>
-              <a:t>jotain</a:t>
+              <a:t>Ohjelmointikielillä voidaan siis määrätä kone tekemään jotain</a:t>
             </a:r>
             <a:endParaRPr lang="en-US" dirty="0" smtClean="0"/>
           </a:p>
@@ -8865,7 +8867,6 @@
               <a:rPr lang="fi-FI" sz="2400" dirty="0" smtClean="0"/>
               <a:t>BASIC</a:t>
             </a:r>
-            <a:endParaRPr lang="fi-FI" sz="2400" dirty="0" smtClean="0"/>
           </a:p>
           <a:p>
             <a:pPr eaLnBrk="1" hangingPunct="1"/>
@@ -9353,9 +9354,21 @@
             </a:r>
             <a:r>
               <a:rPr lang="fi-FI" sz="2000" dirty="0" err="1" smtClean="0"/>
-              <a:t>Ohjelmani.java</a:t>
-            </a:r>
-            <a:endParaRPr lang="fi-FI" sz="2000" dirty="0" smtClean="0"/>
+              <a:t>Ohjelmani</a:t>
+            </a:r>
+            <a:r>
+              <a:rPr lang="fi-FI" sz="2000" dirty="0" err="1" smtClean="0">
+                <a:solidFill>
+                  <a:srgbClr val="FF0000"/>
+                </a:solidFill>
+              </a:rPr>
+              <a:t>.java</a:t>
+            </a:r>
+            <a:endParaRPr lang="fi-FI" sz="2000" dirty="0" smtClean="0">
+              <a:solidFill>
+                <a:srgbClr val="FF0000"/>
+              </a:solidFill>
+            </a:endParaRPr>
           </a:p>
           <a:p>
             <a:pPr eaLnBrk="1" hangingPunct="1"/>
@@ -9401,9 +9414,21 @@
               <a:rPr lang="fi-FI" sz="2000" b="1" dirty="0" err="1" smtClean="0">
                 <a:latin typeface="Lucida Console" pitchFamily="49" charset="0"/>
               </a:rPr>
-              <a:t>Ohjelmani.java</a:t>
+              <a:t>Ohjelmani</a:t>
+            </a:r>
+            <a:r>
+              <a:rPr lang="fi-FI" sz="2000" b="1" dirty="0" err="1" smtClean="0">
+                <a:solidFill>
+                  <a:srgbClr val="FF0000"/>
+                </a:solidFill>
+                <a:latin typeface="Lucida Console" pitchFamily="49" charset="0"/>
+              </a:rPr>
+              <a:t>.java</a:t>
             </a:r>
             <a:endParaRPr lang="fi-FI" sz="2000" b="1" dirty="0" smtClean="0">
+              <a:solidFill>
+                <a:srgbClr val="FF0000"/>
+              </a:solidFill>
               <a:latin typeface="Lucida Console" pitchFamily="49" charset="0"/>
             </a:endParaRPr>
           </a:p>
@@ -9423,9 +9448,21 @@
               <a:rPr lang="fi-FI" sz="2000" b="1" dirty="0" err="1" smtClean="0">
                 <a:latin typeface="Lucida Console" pitchFamily="49" charset="0"/>
               </a:rPr>
-              <a:t>Ohjelmani.class</a:t>
+              <a:t>Ohjelmani</a:t>
+            </a:r>
+            <a:r>
+              <a:rPr lang="fi-FI" sz="2000" b="1" dirty="0" err="1" smtClean="0">
+                <a:solidFill>
+                  <a:srgbClr val="FF0000"/>
+                </a:solidFill>
+                <a:latin typeface="Lucida Console" pitchFamily="49" charset="0"/>
+              </a:rPr>
+              <a:t>.class</a:t>
             </a:r>
             <a:endParaRPr lang="fi-FI" sz="2000" b="1" dirty="0" smtClean="0">
+              <a:solidFill>
+                <a:srgbClr val="FF0000"/>
+              </a:solidFill>
               <a:latin typeface="Lucida Console" pitchFamily="49" charset="0"/>
             </a:endParaRPr>
           </a:p>
@@ -9712,24 +9749,52 @@
           <a:p>
             <a:pPr eaLnBrk="1" hangingPunct="1"/>
             <a:r>
-              <a:rPr lang="fi-FI" smtClean="0"/>
-              <a:t>Ohjelmani.java on lähdekoodia</a:t>
+              <a:rPr lang="fi-FI" dirty="0" smtClean="0"/>
+              <a:t>Ohjelmani</a:t>
+            </a:r>
+            <a:r>
+              <a:rPr lang="fi-FI" dirty="0" smtClean="0">
+                <a:solidFill>
+                  <a:srgbClr val="FF0000"/>
+                </a:solidFill>
+              </a:rPr>
+              <a:t>.java</a:t>
+            </a:r>
+            <a:r>
+              <a:rPr lang="fi-FI" dirty="0" smtClean="0"/>
+              <a:t> on lähdekoodia</a:t>
             </a:r>
           </a:p>
           <a:p>
             <a:pPr eaLnBrk="1" hangingPunct="1"/>
             <a:r>
-              <a:rPr lang="fi-FI" smtClean="0"/>
-              <a:t>Ohjelmani.class on tavukoodia</a:t>
+              <a:rPr lang="fi-FI" dirty="0" err="1" smtClean="0"/>
+              <a:t>Ohjelmani</a:t>
+            </a:r>
+            <a:r>
+              <a:rPr lang="fi-FI" dirty="0" err="1" smtClean="0">
+                <a:solidFill>
+                  <a:srgbClr val="FF0000"/>
+                </a:solidFill>
+              </a:rPr>
+              <a:t>.class</a:t>
+            </a:r>
+            <a:r>
+              <a:rPr lang="fi-FI" dirty="0" smtClean="0"/>
+              <a:t> on tavukoodia</a:t>
             </a:r>
           </a:p>
           <a:p>
             <a:pPr eaLnBrk="1" hangingPunct="1"/>
             <a:r>
-              <a:rPr lang="fi-FI" smtClean="0"/>
-              <a:t>java-komento tulkkaa tavukoodin konekielelle ajonaikaisesti</a:t>
-            </a:r>
-            <a:endParaRPr lang="en-US" smtClean="0"/>
+              <a:rPr lang="fi-FI" dirty="0" err="1" smtClean="0"/>
+              <a:t>java</a:t>
+            </a:r>
+            <a:r>
+              <a:rPr lang="fi-FI" dirty="0" smtClean="0"/>
+              <a:t>-komento tulkkaa tavukoodin konekielelle ajonaikaisesti</a:t>
+            </a:r>
+            <a:endParaRPr lang="en-US" dirty="0" smtClean="0"/>
           </a:p>
         </p:txBody>
       </p:sp>
@@ -10631,9 +10696,13 @@
             </a:pPr>
             <a:r>
               <a:rPr lang="fi-FI" dirty="0" smtClean="0"/>
-              <a:t>Java-tulkkia kutsutaan myös Javan virtuaalikoneeksi</a:t>
-            </a:r>
-            <a:endParaRPr lang="en-US" dirty="0" smtClean="0"/>
+              <a:t>Java-tulkkia kutsutaan myös </a:t>
+            </a:r>
+            <a:r>
+              <a:rPr lang="fi-FI" u="sng" dirty="0" smtClean="0"/>
+              <a:t>Javan virtuaalikoneeksi</a:t>
+            </a:r>
+            <a:endParaRPr lang="en-US" u="sng" dirty="0" smtClean="0"/>
           </a:p>
           <a:p>
             <a:pPr eaLnBrk="1" hangingPunct="1">
@@ -10839,11 +10908,7 @@
             </a:r>
             <a:r>
               <a:rPr lang="fi-FI" dirty="0" smtClean="0"/>
-              <a:t>) ja muita </a:t>
-            </a:r>
-            <a:r>
-              <a:rPr lang="fi-FI" dirty="0" smtClean="0"/>
-              <a:t>apuvälineitä</a:t>
+              <a:t>) ja muita apuvälineitä</a:t>
             </a:r>
             <a:endParaRPr lang="en-US" dirty="0" smtClean="0"/>
           </a:p>
@@ -10983,7 +11048,6 @@
               <a:rPr lang="fi-FI" sz="2000" b="1" dirty="0" smtClean="0"/>
               <a:t>++</a:t>
             </a:r>
-            <a:endParaRPr lang="fi-FI" sz="2000" b="1" dirty="0" smtClean="0"/>
           </a:p>
           <a:p>
             <a:pPr lvl="1" eaLnBrk="1" hangingPunct="1">
@@ -11109,7 +11173,6 @@
               <a:rPr lang="fi-FI" sz="2000" dirty="0" smtClean="0"/>
               <a:t>…</a:t>
             </a:r>
-            <a:endParaRPr lang="fi-FI" sz="2000" dirty="0" smtClean="0"/>
           </a:p>
         </p:txBody>
       </p:sp>
@@ -13458,15 +13521,7 @@
             <a:pPr eaLnBrk="1" hangingPunct="1"/>
             <a:r>
               <a:rPr lang="fi-FI" sz="2400" dirty="0" smtClean="0"/>
-              <a:t>Ensimmäisten ohjelmiesi </a:t>
-            </a:r>
-            <a:r>
-              <a:rPr lang="fi-FI" sz="2400" dirty="0" smtClean="0"/>
-              <a:t>koodi kirjoitetaan </a:t>
-            </a:r>
-            <a:r>
-              <a:rPr lang="fi-FI" sz="2400" dirty="0" smtClean="0"/>
-              <a:t>päämetodin aaltosulkujen sisään</a:t>
+              <a:t>Ensimmäisten ohjelmiesi koodi kirjoitetaan päämetodin aaltosulkujen sisään</a:t>
             </a:r>
           </a:p>
           <a:p>
@@ -14532,11 +14587,7 @@
             </a:r>
             <a:r>
               <a:rPr lang="fi-FI" sz="2000" b="1" i="1" dirty="0" smtClean="0"/>
-              <a:t>Kevät</a:t>
-            </a:r>
-            <a:r>
-              <a:rPr lang="fi-FI" sz="2000" b="1" i="1" dirty="0" smtClean="0"/>
-              <a:t> 17)</a:t>
+              <a:t>Syksy 2017, Leppävaara)</a:t>
             </a:r>
             <a:endParaRPr lang="en-GB" sz="2000" b="1" i="1" dirty="0" smtClean="0"/>
           </a:p>
@@ -14625,7 +14676,7 @@
           <a:p>
             <a:fld id="{AFDED2E8-740F-43D4-96A1-4ED0B44158FD}" type="datetime1">
               <a:rPr lang="fi-FI" smtClean="0"/>
-              <a:t>18.1.2017</a:t>
+              <a:t>1.9.2017</a:t>
             </a:fld>
             <a:endParaRPr lang="en-US" dirty="0" smtClean="0"/>
           </a:p>
@@ -14921,13 +14972,22 @@
               <a:t>(</a:t>
             </a:r>
             <a:r>
+              <a:rPr lang="fi-FI" sz="1200" b="1" dirty="0">
+                <a:solidFill>
+                  <a:prstClr val="black"/>
+                </a:solidFill>
+                <a:latin typeface="Calibri" panose="020F0502020204030204"/>
+              </a:rPr>
+              <a:t>9</a:t>
+            </a:r>
+            <a:r>
               <a:rPr lang="fi-FI" sz="1200" b="1" dirty="0" smtClean="0">
                 <a:solidFill>
                   <a:prstClr val="black"/>
                 </a:solidFill>
                 <a:latin typeface="Calibri" panose="020F0502020204030204"/>
               </a:rPr>
-              <a:t>11 </a:t>
+              <a:t> </a:t>
             </a:r>
             <a:r>
               <a:rPr lang="fi-FI" sz="1200" b="1" dirty="0" err="1" smtClean="0">
@@ -15616,12 +15676,6 @@
               </a:rPr>
               <a:t>30</a:t>
             </a:r>
-            <a:endParaRPr lang="fi-FI" sz="1400" b="1" dirty="0" smtClean="0">
-              <a:solidFill>
-                <a:prstClr val="black"/>
-              </a:solidFill>
-              <a:latin typeface="Calibri" panose="020F0502020204030204"/>
-            </a:endParaRPr>
           </a:p>
           <a:p>
             <a:pPr algn="ctr" eaLnBrk="1" fontAlgn="auto" hangingPunct="1">
@@ -15762,12 +15816,6 @@
               </a:rPr>
               <a:t>0</a:t>
             </a:r>
-            <a:endParaRPr lang="fi-FI" sz="1400" b="1" dirty="0" smtClean="0">
-              <a:solidFill>
-                <a:prstClr val="black"/>
-              </a:solidFill>
-              <a:latin typeface="Calibri" panose="020F0502020204030204"/>
-            </a:endParaRPr>
           </a:p>
           <a:p>
             <a:pPr algn="ctr" eaLnBrk="1" fontAlgn="auto" hangingPunct="1">

</xml_diff>